<commit_message>
Updated Size Limits lectures
</commit_message>
<xml_diff>
--- a/modules/DISCUSSIONS/READING_Isermannetal_2007.pptx
+++ b/modules/DISCUSSIONS/READING_Isermannetal_2007.pptx
@@ -267,7 +267,7 @@
           <a:p>
             <a:fld id="{07A46C8F-DB9C-4B91-A1F1-A860256637FA}" type="datetimeFigureOut">
               <a:rPr lang="en-US" smtClean="0"/>
-              <a:t>3/13/2016</a:t>
+              <a:t>4/5/2022</a:t>
             </a:fld>
             <a:endParaRPr lang="en-US"/>
           </a:p>
@@ -437,7 +437,7 @@
           <a:p>
             <a:fld id="{07A46C8F-DB9C-4B91-A1F1-A860256637FA}" type="datetimeFigureOut">
               <a:rPr lang="en-US" smtClean="0"/>
-              <a:t>3/13/2016</a:t>
+              <a:t>4/5/2022</a:t>
             </a:fld>
             <a:endParaRPr lang="en-US"/>
           </a:p>
@@ -617,7 +617,7 @@
           <a:p>
             <a:fld id="{07A46C8F-DB9C-4B91-A1F1-A860256637FA}" type="datetimeFigureOut">
               <a:rPr lang="en-US" smtClean="0"/>
-              <a:t>3/13/2016</a:t>
+              <a:t>4/5/2022</a:t>
             </a:fld>
             <a:endParaRPr lang="en-US"/>
           </a:p>
@@ -787,7 +787,7 @@
           <a:p>
             <a:fld id="{07A46C8F-DB9C-4B91-A1F1-A860256637FA}" type="datetimeFigureOut">
               <a:rPr lang="en-US" smtClean="0"/>
-              <a:t>3/13/2016</a:t>
+              <a:t>4/5/2022</a:t>
             </a:fld>
             <a:endParaRPr lang="en-US"/>
           </a:p>
@@ -1031,7 +1031,7 @@
           <a:p>
             <a:fld id="{07A46C8F-DB9C-4B91-A1F1-A860256637FA}" type="datetimeFigureOut">
               <a:rPr lang="en-US" smtClean="0"/>
-              <a:t>3/13/2016</a:t>
+              <a:t>4/5/2022</a:t>
             </a:fld>
             <a:endParaRPr lang="en-US"/>
           </a:p>
@@ -1263,7 +1263,7 @@
           <a:p>
             <a:fld id="{07A46C8F-DB9C-4B91-A1F1-A860256637FA}" type="datetimeFigureOut">
               <a:rPr lang="en-US" smtClean="0"/>
-              <a:t>3/13/2016</a:t>
+              <a:t>4/5/2022</a:t>
             </a:fld>
             <a:endParaRPr lang="en-US"/>
           </a:p>
@@ -1630,7 +1630,7 @@
           <a:p>
             <a:fld id="{07A46C8F-DB9C-4B91-A1F1-A860256637FA}" type="datetimeFigureOut">
               <a:rPr lang="en-US" smtClean="0"/>
-              <a:t>3/13/2016</a:t>
+              <a:t>4/5/2022</a:t>
             </a:fld>
             <a:endParaRPr lang="en-US"/>
           </a:p>
@@ -1748,7 +1748,7 @@
           <a:p>
             <a:fld id="{07A46C8F-DB9C-4B91-A1F1-A860256637FA}" type="datetimeFigureOut">
               <a:rPr lang="en-US" smtClean="0"/>
-              <a:t>3/13/2016</a:t>
+              <a:t>4/5/2022</a:t>
             </a:fld>
             <a:endParaRPr lang="en-US"/>
           </a:p>
@@ -1843,7 +1843,7 @@
           <a:p>
             <a:fld id="{07A46C8F-DB9C-4B91-A1F1-A860256637FA}" type="datetimeFigureOut">
               <a:rPr lang="en-US" smtClean="0"/>
-              <a:t>3/13/2016</a:t>
+              <a:t>4/5/2022</a:t>
             </a:fld>
             <a:endParaRPr lang="en-US"/>
           </a:p>
@@ -2120,7 +2120,7 @@
           <a:p>
             <a:fld id="{07A46C8F-DB9C-4B91-A1F1-A860256637FA}" type="datetimeFigureOut">
               <a:rPr lang="en-US" smtClean="0"/>
-              <a:t>3/13/2016</a:t>
+              <a:t>4/5/2022</a:t>
             </a:fld>
             <a:endParaRPr lang="en-US"/>
           </a:p>
@@ -2377,7 +2377,7 @@
           <a:p>
             <a:fld id="{07A46C8F-DB9C-4B91-A1F1-A860256637FA}" type="datetimeFigureOut">
               <a:rPr lang="en-US" smtClean="0"/>
-              <a:t>3/13/2016</a:t>
+              <a:t>4/5/2022</a:t>
             </a:fld>
             <a:endParaRPr lang="en-US"/>
           </a:p>
@@ -2590,7 +2590,7 @@
           <a:p>
             <a:fld id="{07A46C8F-DB9C-4B91-A1F1-A860256637FA}" type="datetimeFigureOut">
               <a:rPr lang="en-US" smtClean="0"/>
-              <a:t>3/13/2016</a:t>
+              <a:t>4/5/2022</a:t>
             </a:fld>
             <a:endParaRPr lang="en-US"/>
           </a:p>

</xml_diff>